<commit_message>
Update after project is almost complete.
</commit_message>
<xml_diff>
--- a/Lu, Sammi - ENGI301_project_proposal (Updated by 10:11:18).pptx
+++ b/Lu, Sammi - ENGI301_project_proposal (Updated by 10:11:18).pptx
@@ -221,7 +221,7 @@
           <a:p>
             <a:fld id="{59041DB8-B66F-4DC8-A96E-33677E0F90FF}" type="datetimeFigureOut">
               <a:rPr lang="en-US" smtClean="0"/>
-              <a:t>10/11/18</a:t>
+              <a:t>10/14/18</a:t>
             </a:fld>
             <a:endParaRPr lang="en-US"/>
           </a:p>
@@ -386,7 +386,7 @@
           <a:p>
             <a:fld id="{DEB49C4A-65AC-492D-9701-81B46C3AD0E4}" type="datetimeFigureOut">
               <a:rPr lang="en-US" smtClean="0"/>
-              <a:t>10/11/18</a:t>
+              <a:t>10/14/18</a:t>
             </a:fld>
             <a:endParaRPr lang="en-US"/>
           </a:p>
@@ -955,11 +955,7 @@
           <a:p>
             <a:r>
               <a:rPr lang="en-US" baseline="0" dirty="0" smtClean="0"/>
-              <a:t>On/off </a:t>
-            </a:r>
-            <a:r>
-              <a:rPr lang="en-US" baseline="0" dirty="0" smtClean="0"/>
-              <a:t>switch</a:t>
+              <a:t>On/off switch</a:t>
             </a:r>
           </a:p>
           <a:p>
@@ -19920,7 +19916,7 @@
               <a:t>Init</a:t>
             </a:r>
             <a:r>
-              <a:rPr lang="en-US" sz="1200" b="0" i="0" u="none" strike="noStrike" kern="1200" smtClean="0">
+              <a:rPr lang="en-US" sz="1200" b="0" i="0" u="none" strike="noStrike" kern="1200" dirty="0" smtClean="0">
                 <a:solidFill>
                   <a:schemeClr val="tx1"/>
                 </a:solidFill>
@@ -22337,7 +22333,7 @@
           <a:p>
             <a:fld id="{384A29A4-78C8-47AB-BA06-22CB45938951}" type="datetime1">
               <a:rPr lang="en-US" smtClean="0"/>
-              <a:t>10/11/18</a:t>
+              <a:t>10/14/18</a:t>
             </a:fld>
             <a:endParaRPr lang="en-US"/>
           </a:p>
@@ -22532,7 +22528,7 @@
           <a:p>
             <a:fld id="{E1ED4ACF-2D82-46F2-A8E9-23963AA34E86}" type="datetime1">
               <a:rPr lang="en-US" smtClean="0"/>
-              <a:t>10/11/18</a:t>
+              <a:t>10/14/18</a:t>
             </a:fld>
             <a:endParaRPr lang="en-US"/>
           </a:p>
@@ -22726,7 +22722,7 @@
           <a:p>
             <a:fld id="{AE374B5B-21A0-4192-BF4C-38187F1A68D8}" type="datetime1">
               <a:rPr lang="en-US" smtClean="0"/>
-              <a:t>10/11/18</a:t>
+              <a:t>10/14/18</a:t>
             </a:fld>
             <a:endParaRPr lang="en-US"/>
           </a:p>
@@ -25067,7 +25063,7 @@
           <a:p>
             <a:fld id="{33B5CF7C-B333-48E1-A4A6-83A3C8B73AC0}" type="datetime1">
               <a:rPr lang="en-US" smtClean="0"/>
-              <a:t>10/11/18</a:t>
+              <a:t>10/14/18</a:t>
             </a:fld>
             <a:endParaRPr lang="en-US"/>
           </a:p>
@@ -25520,7 +25516,7 @@
           <a:p>
             <a:fld id="{AE320762-5CBF-4210-AB54-376B091119F8}" type="datetime1">
               <a:rPr lang="en-US" smtClean="0"/>
-              <a:t>10/11/18</a:t>
+              <a:t>10/14/18</a:t>
             </a:fld>
             <a:endParaRPr lang="en-US"/>
           </a:p>
@@ -25652,7 +25648,7 @@
           <a:p>
             <a:fld id="{7F0DB371-BF5F-4058-A212-1A908E4D2674}" type="datetime1">
               <a:rPr lang="en-US" smtClean="0"/>
-              <a:t>10/11/18</a:t>
+              <a:t>10/14/18</a:t>
             </a:fld>
             <a:endParaRPr lang="en-US"/>
           </a:p>
@@ -27585,7 +27581,7 @@
           <a:p>
             <a:fld id="{60A4083B-90AA-48CF-BAD5-00AA24D7F288}" type="datetime1">
               <a:rPr lang="en-US" smtClean="0"/>
-              <a:t>10/11/18</a:t>
+              <a:t>10/14/18</a:t>
             </a:fld>
             <a:endParaRPr lang="en-US"/>
           </a:p>
@@ -29844,7 +29840,7 @@
             <a:fld id="{F5BAF629-ECA2-4CF3-B790-9D9BDED98269}" type="datetime1">
               <a:rPr lang="en-US" smtClean="0"/>
               <a:pPr/>
-              <a:t>10/11/18</a:t>
+              <a:t>10/14/18</a:t>
             </a:fld>
             <a:endParaRPr lang="en-US"/>
           </a:p>
@@ -34139,7 +34135,7 @@
             <a:fld id="{B51B2453-8663-4C69-AF73-9FD7B1DEC5D0}" type="datetime1">
               <a:rPr lang="en-US" smtClean="0"/>
               <a:pPr/>
-              <a:t>10/11/18</a:t>
+              <a:t>10/14/18</a:t>
             </a:fld>
             <a:endParaRPr lang="en-US" dirty="0"/>
           </a:p>
@@ -34855,23 +34851,14 @@
             <a:pPr lvl="2"/>
             <a:r>
               <a:rPr lang="en-US" sz="1800" dirty="0" smtClean="0"/>
-              <a:t>Include various lighting patterns for the user to choose </a:t>
-            </a:r>
+              <a:t>Include various lighting patterns for the user to choose from (Spooky Vs. Happy)</a:t>
+            </a:r>
+          </a:p>
+          <a:p>
+            <a:pPr lvl="2"/>
             <a:r>
               <a:rPr lang="en-US" sz="1800" dirty="0" smtClean="0"/>
-              <a:t>from (Spooky Vs. Happy)</a:t>
-            </a:r>
-            <a:endParaRPr lang="en-US" sz="1800" dirty="0" smtClean="0"/>
-          </a:p>
-          <a:p>
-            <a:pPr lvl="2"/>
-            <a:r>
-              <a:rPr lang="en-US" sz="1800" dirty="0" smtClean="0"/>
-              <a:t>Include automatic shutting down of the system after a certain </a:t>
-            </a:r>
-            <a:r>
-              <a:rPr lang="en-US" sz="1800" dirty="0" smtClean="0"/>
-              <a:t>time</a:t>
+              <a:t>Include automatic shutting down of the system after a certain time</a:t>
             </a:r>
           </a:p>
         </p:txBody>
@@ -36702,7 +36689,7 @@
               </a:spcBef>
             </a:pPr>
             <a:r>
-              <a:rPr lang="en-US" smtClean="0"/>
+              <a:rPr lang="en-US" dirty="0" smtClean="0"/>
               <a:t>Not able to get LED to light up</a:t>
             </a:r>
           </a:p>

</xml_diff>